<commit_message>
Adding feature of Prompt
</commit_message>
<xml_diff>
--- a/python-preprocessor/output/preprocessed_sample.pptx
+++ b/python-preprocessor/output/preprocessed_sample.pptx
@@ -3266,7 +3266,7 @@
                   <a:srgbClr val="FFFFFF"/>
                 </a:solidFill>
               </a:rPr>
-              <a:t>{{CONTENT_1_SLIDE_1}}</a:t>
+              <a:t>{{CONTENT_1_SLIDE_1_W2}}</a:t>
             </a:r>
           </a:p>
         </p:txBody>
@@ -3527,7 +3527,7 @@
                   <a:srgbClr val="F8EDDE"/>
                 </a:solidFill>
               </a:rPr>
-              <a:t>{{CONTENT_2_SLIDE_1}}</a:t>
+              <a:t>{{CONTENT_2_SLIDE_1_W3}}</a:t>
             </a:r>
           </a:p>
         </p:txBody>
@@ -3652,7 +3652,7 @@
                   <a:srgbClr val="5E4840"/>
                 </a:solidFill>
               </a:rPr>
-              <a:t>{{CONTENT_1_SLIDE_10}}</a:t>
+              <a:t>{{CONTENT_1_SLIDE_10_W4}}</a:t>
             </a:r>
           </a:p>
         </p:txBody>
@@ -3717,7 +3717,7 @@
                   <a:srgbClr val="5E4840"/>
                 </a:solidFill>
               </a:rPr>
-              <a:t>{{BULLET_POINTS_2_SLIDE_10}}</a:t>
+              <a:t>{{BULLET_2_SLIDE_10_W5}}</a:t>
             </a:r>
           </a:p>
         </p:txBody>
@@ -4186,7 +4186,7 @@
                   <a:srgbClr val="5E4840"/>
                 </a:solidFill>
               </a:rPr>
-              <a:t>{{HEADER_2_SLIDE_2}}</a:t>
+              <a:t>{{HEADER_2_SLIDE_2_W3}}</a:t>
             </a:r>
           </a:p>
         </p:txBody>
@@ -4223,7 +4223,7 @@
                   <a:srgbClr val="5E4840"/>
                 </a:solidFill>
               </a:rPr>
-              <a:t>{{HEADER_1_SLIDE_2}}</a:t>
+              <a:t>{{HEADER_1_SLIDE_2_W2}}</a:t>
             </a:r>
           </a:p>
         </p:txBody>
@@ -4262,7 +4262,7 @@
                   <a:srgbClr val="FFFFFF"/>
                 </a:solidFill>
               </a:rPr>
-              <a:t>{{CONTENT_3_SLIDE_2}}</a:t>
+              <a:t>{{CONTENT_4_SLIDE_2_W2}}</a:t>
             </a:r>
           </a:p>
         </p:txBody>
@@ -4301,7 +4301,7 @@
                   <a:srgbClr val="FFFFFF"/>
                 </a:solidFill>
               </a:rPr>
-              <a:t>{{CONTENT_5_SLIDE_2}}</a:t>
+              <a:t>{{CONTENT_6_SLIDE_2_W2}}</a:t>
             </a:r>
           </a:p>
         </p:txBody>
@@ -4340,7 +4340,7 @@
                   <a:srgbClr val="FFFFFF"/>
                 </a:solidFill>
               </a:rPr>
-              <a:t>{{CONTENT_4_SLIDE_2}}</a:t>
+              <a:t>{{CONTENT_3_SLIDE_2_W2}}</a:t>
             </a:r>
           </a:p>
         </p:txBody>
@@ -4379,7 +4379,7 @@
                   <a:srgbClr val="FFFFFF"/>
                 </a:solidFill>
               </a:rPr>
-              <a:t>{{CONTENT_6_SLIDE_2}}</a:t>
+              <a:t>{{CONTENT_5_SLIDE_2_W1}}</a:t>
             </a:r>
           </a:p>
         </p:txBody>
@@ -4418,7 +4418,7 @@
                   <a:srgbClr val="FFFFFF"/>
                 </a:solidFill>
               </a:rPr>
-              <a:t>{{CONTENT_7_SLIDE_2}}</a:t>
+              <a:t>{{CONTENT_7_SLIDE_2_W2}}</a:t>
             </a:r>
           </a:p>
         </p:txBody>
@@ -4457,7 +4457,7 @@
                   <a:srgbClr val="FFFFFF"/>
                 </a:solidFill>
               </a:rPr>
-              <a:t>{{CONTENT_8_SLIDE_2}}</a:t>
+              <a:t>{{CONTENT_8_SLIDE_2_W1}}</a:t>
             </a:r>
           </a:p>
         </p:txBody>
@@ -4672,7 +4672,7 @@
                   <a:srgbClr val="5E4840"/>
                 </a:solidFill>
               </a:rPr>
-              <a:t>{{HEADER_2_SLIDE_3}}</a:t>
+              <a:t>{{HEADER_2_SLIDE_3_W5}}</a:t>
             </a:r>
           </a:p>
         </p:txBody>
@@ -4709,7 +4709,7 @@
                   <a:srgbClr val="5E4840"/>
                 </a:solidFill>
               </a:rPr>
-              <a:t>{{HEADER_1_SLIDE_3}}</a:t>
+              <a:t>{{HEADER_1_SLIDE_3_W2}}</a:t>
             </a:r>
           </a:p>
         </p:txBody>
@@ -4746,7 +4746,7 @@
                   <a:srgbClr val="FFFFFF"/>
                 </a:solidFill>
               </a:rPr>
-              <a:t>{{CONTENT_3_SLIDE_3}}</a:t>
+              <a:t>{{CONTENT_3_SLIDE_3_W41}}</a:t>
             </a:r>
           </a:p>
         </p:txBody>
@@ -4961,7 +4961,7 @@
                   <a:srgbClr val="5E4840"/>
                 </a:solidFill>
               </a:rPr>
-              <a:t>{{HEADER_1_SLIDE_4}}</a:t>
+              <a:t>{{HEADER_1_SLIDE_4_W2}}</a:t>
             </a:r>
           </a:p>
         </p:txBody>
@@ -4998,7 +4998,7 @@
                   <a:srgbClr val="5E4840"/>
                 </a:solidFill>
               </a:rPr>
-              <a:t>{{HEADER_2_SLIDE_4}}</a:t>
+              <a:t>{{HEADER_2_SLIDE_4_W1}}</a:t>
             </a:r>
           </a:p>
         </p:txBody>
@@ -5171,7 +5171,7 @@
                   <a:srgbClr val="FFFFFF"/>
                 </a:solidFill>
               </a:rPr>
-              <a:t>{{CONTENT_6_SLIDE_4}}</a:t>
+              <a:t>{{CONTENT_6_SLIDE_4_W2}}</a:t>
             </a:r>
           </a:p>
         </p:txBody>
@@ -5208,7 +5208,7 @@
                   <a:srgbClr val="FFFFFF"/>
                 </a:solidFill>
               </a:rPr>
-              <a:t>{{BULLET_POINTS_3_SLIDE_4}}</a:t>
+              <a:t>{{BULLET_3_SLIDE_4_W2}}</a:t>
             </a:r>
           </a:p>
         </p:txBody>
@@ -5381,7 +5381,7 @@
                   <a:srgbClr val="FFFFFF"/>
                 </a:solidFill>
               </a:rPr>
-              <a:t>{{CONTENT_7_SLIDE_4}}</a:t>
+              <a:t>{{CONTENT_7_SLIDE_4_W2}}</a:t>
             </a:r>
           </a:p>
         </p:txBody>
@@ -5418,7 +5418,7 @@
                   <a:srgbClr val="FFFFFF"/>
                 </a:solidFill>
               </a:rPr>
-              <a:t>{{BULLET_POINTS_4_SLIDE_4}}</a:t>
+              <a:t>{{BULLET_4_SLIDE_4_W2}}</a:t>
             </a:r>
           </a:p>
         </p:txBody>
@@ -5591,7 +5591,7 @@
                   <a:srgbClr val="FFFFFF"/>
                 </a:solidFill>
               </a:rPr>
-              <a:t>{{CONTENT_8_SLIDE_4}}</a:t>
+              <a:t>{{CONTENT_8_SLIDE_4_W2}}</a:t>
             </a:r>
           </a:p>
         </p:txBody>
@@ -5628,7 +5628,7 @@
                   <a:srgbClr val="FFFFFF"/>
                 </a:solidFill>
               </a:rPr>
-              <a:t>{{BULLET_POINTS_5_SLIDE_4}}</a:t>
+              <a:t>{{BULLET_5_SLIDE_4_W2}}</a:t>
             </a:r>
           </a:p>
         </p:txBody>
@@ -6134,7 +6134,7 @@
                   <a:srgbClr val="5E4840"/>
                 </a:solidFill>
               </a:rPr>
-              <a:t>{{HEADER_1_SLIDE_5}}</a:t>
+              <a:t>{{HEADER_1_SLIDE_5_W2}}</a:t>
             </a:r>
           </a:p>
         </p:txBody>
@@ -6171,7 +6171,7 @@
                   <a:srgbClr val="5E4840"/>
                 </a:solidFill>
               </a:rPr>
-              <a:t>{{HEADER_2_SLIDE_5}}</a:t>
+              <a:t>{{HEADER_2_SLIDE_5_W2}}</a:t>
             </a:r>
           </a:p>
         </p:txBody>
@@ -6210,7 +6210,7 @@
                   <a:srgbClr val="FFFFFF"/>
                 </a:solidFill>
               </a:rPr>
-              <a:t>{{CONTENT_3_SLIDE_5}}</a:t>
+              <a:t>{{CONTENT_3_SLIDE_5_W2}}</a:t>
             </a:r>
           </a:p>
         </p:txBody>
@@ -6249,7 +6249,7 @@
                   <a:srgbClr val="FFFFFF"/>
                 </a:solidFill>
               </a:rPr>
-              <a:t>{{CONTENT_4_SLIDE_5}}</a:t>
+              <a:t>{{CONTENT_4_SLIDE_5_W2}}</a:t>
             </a:r>
           </a:p>
         </p:txBody>
@@ -6288,7 +6288,7 @@
                   <a:srgbClr val="FFFFFF"/>
                 </a:solidFill>
               </a:rPr>
-              <a:t>{{CONTENT_5_SLIDE_5}}</a:t>
+              <a:t>{{CONTENT_5_SLIDE_5_W2}}</a:t>
             </a:r>
           </a:p>
         </p:txBody>
@@ -6357,7 +6357,7 @@
                   <a:srgbClr val="5E4840"/>
                 </a:solidFill>
               </a:rPr>
-              <a:t>{{HEADER_1_SLIDE_6}}</a:t>
+              <a:t>{{HEADER_1_SLIDE_6_W2}}</a:t>
             </a:r>
           </a:p>
         </p:txBody>
@@ -6451,7 +6451,7 @@
                   <a:srgbClr val="5E4840"/>
                 </a:solidFill>
               </a:rPr>
-              <a:t>{{HEADER_2_SLIDE_6}}</a:t>
+              <a:t>{{HEADER_2_SLIDE_6_W2}}</a:t>
             </a:r>
           </a:p>
         </p:txBody>
@@ -6579,7 +6579,7 @@
                   <a:srgbClr val="FFFFFF"/>
                 </a:solidFill>
               </a:rPr>
-              <a:t>{{BULLET_POINTS_3_SLIDE_6}}</a:t>
+              <a:t>{{BULLET_3_SLIDE_6_W5}}</a:t>
             </a:r>
           </a:p>
         </p:txBody>
@@ -6618,7 +6618,7 @@
                   <a:srgbClr val="FFFFFF"/>
                 </a:solidFill>
               </a:rPr>
-              <a:t>{{BULLET_POINTS_6_SLIDE_6}}</a:t>
+              <a:t>{{BULLET_6_SLIDE_6_W4}}</a:t>
             </a:r>
           </a:p>
         </p:txBody>
@@ -6655,7 +6655,7 @@
                   <a:srgbClr val="FFFFFF"/>
                 </a:solidFill>
               </a:rPr>
-              <a:t>{{CONTENT_4_SLIDE_6}}</a:t>
+              <a:t>{{CONTENT_4_SLIDE_6_W23}}</a:t>
             </a:r>
           </a:p>
         </p:txBody>
@@ -6692,7 +6692,7 @@
                   <a:srgbClr val="FFFFFF"/>
                 </a:solidFill>
               </a:rPr>
-              <a:t>{{CONTENT_5_SLIDE_6}}</a:t>
+              <a:t>{{CONTENT_5_SLIDE_6_W23}}</a:t>
             </a:r>
           </a:p>
         </p:txBody>
@@ -7299,7 +7299,7 @@
                   <a:srgbClr val="5E4840"/>
                 </a:solidFill>
               </a:rPr>
-              <a:t>{{HEADER_1_SLIDE_7}}</a:t>
+              <a:t>{{HEADER_1_SLIDE_7_W2}}</a:t>
             </a:r>
           </a:p>
         </p:txBody>
@@ -7336,7 +7336,7 @@
                   <a:srgbClr val="5E4840"/>
                 </a:solidFill>
               </a:rPr>
-              <a:t>{{HEADER_2_SLIDE_7}}</a:t>
+              <a:t>{{HEADER_2_SLIDE_7_W2}}</a:t>
             </a:r>
           </a:p>
         </p:txBody>
@@ -7373,7 +7373,7 @@
                   <a:srgbClr val="FFFFFF"/>
                 </a:solidFill>
               </a:rPr>
-              <a:t>{{CONTENT_3_SLIDE_7}}</a:t>
+              <a:t>{{CONTENT_3_SLIDE_7_W23}}</a:t>
             </a:r>
           </a:p>
         </p:txBody>
@@ -7807,7 +7807,7 @@
                   <a:srgbClr val="5E4840"/>
                 </a:solidFill>
               </a:rPr>
-              <a:t>{{HEADER_1_SLIDE_8}}</a:t>
+              <a:t>{{HEADER_1_SLIDE_8_W2}}</a:t>
             </a:r>
           </a:p>
         </p:txBody>
@@ -7844,7 +7844,7 @@
                   <a:srgbClr val="5E4840"/>
                 </a:solidFill>
               </a:rPr>
-              <a:t>{{HEADER_2_SLIDE_8}}</a:t>
+              <a:t>{{HEADER_2_SLIDE_8_W2}}</a:t>
             </a:r>
           </a:p>
         </p:txBody>
@@ -7881,7 +7881,7 @@
                   <a:srgbClr val="FFFFFF"/>
                 </a:solidFill>
               </a:rPr>
-              <a:t>{{CONTENT_3_SLIDE_8}}</a:t>
+              <a:t>{{CONTENT_3_SLIDE_8_W3}}</a:t>
             </a:r>
           </a:p>
         </p:txBody>
@@ -7918,7 +7918,7 @@
                   <a:srgbClr val="FFFFFF"/>
                 </a:solidFill>
               </a:rPr>
-              <a:t>{{CONTENT_4_SLIDE_8}}</a:t>
+              <a:t>{{CONTENT_4_SLIDE_8_W23}}</a:t>
             </a:r>
           </a:p>
         </p:txBody>
@@ -7955,7 +7955,7 @@
                   <a:srgbClr val="FFFFFF"/>
                 </a:solidFill>
               </a:rPr>
-              <a:t>{{CONTENT_5_SLIDE_8}}</a:t>
+              <a:t>{{CONTENT_5_SLIDE_8_W23}}</a:t>
             </a:r>
           </a:p>
         </p:txBody>
@@ -8024,7 +8024,7 @@
                   <a:srgbClr val="5E4840"/>
                 </a:solidFill>
               </a:rPr>
-              <a:t>{{HEADER_2_SLIDE_9}}</a:t>
+              <a:t>{{HEADER_2_SLIDE_9_W2}}</a:t>
             </a:r>
           </a:p>
         </p:txBody>
@@ -8426,7 +8426,7 @@
                   <a:srgbClr val="5E4840"/>
                 </a:solidFill>
               </a:rPr>
-              <a:t>{{HEADER_1_SLIDE_9}}</a:t>
+              <a:t>{{HEADER_1_SLIDE_9_W2}}</a:t>
             </a:r>
           </a:p>
         </p:txBody>
@@ -8463,7 +8463,7 @@
                   <a:srgbClr val="FFFFFF"/>
                 </a:solidFill>
               </a:rPr>
-              <a:t>{{CONTENT_3_SLIDE_9}}</a:t>
+              <a:t>{{CONTENT_3_SLIDE_9_W3}}</a:t>
             </a:r>
           </a:p>
         </p:txBody>
@@ -8500,7 +8500,7 @@
                   <a:srgbClr val="FFFFFF"/>
                 </a:solidFill>
               </a:rPr>
-              <a:t>{{CONTENT_4_SLIDE_9}}</a:t>
+              <a:t>{{CONTENT_4_SLIDE_9_W23}}</a:t>
             </a:r>
           </a:p>
         </p:txBody>
@@ -8537,7 +8537,7 @@
                   <a:srgbClr val="FFFFFF"/>
                 </a:solidFill>
               </a:rPr>
-              <a:t>{{CONTENT_5_SLIDE_9}}</a:t>
+              <a:t>{{CONTENT_5_SLIDE_9_W23}}</a:t>
             </a:r>
           </a:p>
         </p:txBody>

</xml_diff>